<commit_message>
Update dates in presentations
</commit_message>
<xml_diff>
--- a/files/crypto.pptx
+++ b/files/crypto.pptx
@@ -219,7 +219,7 @@
           <a:p>
             <a:fld id="{C6513600-717B-4CBB-9AFE-1F576C1D3E1D}" type="datetimeFigureOut">
               <a:rPr lang="he-IL" smtClean="0"/>
-              <a:t>י"א/אדר א/תשפ"ד</a:t>
+              <a:t>כ"ג/חשון/תשפ"ו</a:t>
             </a:fld>
             <a:endParaRPr lang="he-IL"/>
           </a:p>
@@ -2195,7 +2195,7 @@
           <a:p>
             <a:fld id="{02109FA5-8937-4EFE-A1A6-BD6EB76E3D9A}" type="datetimeFigureOut">
               <a:rPr lang="he-IL" smtClean="0"/>
-              <a:t>י"א/אדר א/תשפ"ד</a:t>
+              <a:t>כ"ג/חשון/תשפ"ו</a:t>
             </a:fld>
             <a:endParaRPr lang="he-IL"/>
           </a:p>
@@ -2395,7 +2395,7 @@
           <a:p>
             <a:fld id="{02109FA5-8937-4EFE-A1A6-BD6EB76E3D9A}" type="datetimeFigureOut">
               <a:rPr lang="he-IL" smtClean="0"/>
-              <a:t>י"א/אדר א/תשפ"ד</a:t>
+              <a:t>כ"ג/חשון/תשפ"ו</a:t>
             </a:fld>
             <a:endParaRPr lang="he-IL"/>
           </a:p>
@@ -2605,7 +2605,7 @@
           <a:p>
             <a:fld id="{02109FA5-8937-4EFE-A1A6-BD6EB76E3D9A}" type="datetimeFigureOut">
               <a:rPr lang="he-IL" smtClean="0"/>
-              <a:t>י"א/אדר א/תשפ"ד</a:t>
+              <a:t>כ"ג/חשון/תשפ"ו</a:t>
             </a:fld>
             <a:endParaRPr lang="he-IL"/>
           </a:p>
@@ -2805,7 +2805,7 @@
           <a:p>
             <a:fld id="{02109FA5-8937-4EFE-A1A6-BD6EB76E3D9A}" type="datetimeFigureOut">
               <a:rPr lang="he-IL" smtClean="0"/>
-              <a:t>י"א/אדר א/תשפ"ד</a:t>
+              <a:t>כ"ג/חשון/תשפ"ו</a:t>
             </a:fld>
             <a:endParaRPr lang="he-IL"/>
           </a:p>
@@ -3081,7 +3081,7 @@
           <a:p>
             <a:fld id="{02109FA5-8937-4EFE-A1A6-BD6EB76E3D9A}" type="datetimeFigureOut">
               <a:rPr lang="he-IL" smtClean="0"/>
-              <a:t>י"א/אדר א/תשפ"ד</a:t>
+              <a:t>כ"ג/חשון/תשפ"ו</a:t>
             </a:fld>
             <a:endParaRPr lang="he-IL"/>
           </a:p>
@@ -3349,7 +3349,7 @@
           <a:p>
             <a:fld id="{02109FA5-8937-4EFE-A1A6-BD6EB76E3D9A}" type="datetimeFigureOut">
               <a:rPr lang="he-IL" smtClean="0"/>
-              <a:t>י"א/אדר א/תשפ"ד</a:t>
+              <a:t>כ"ג/חשון/תשפ"ו</a:t>
             </a:fld>
             <a:endParaRPr lang="he-IL"/>
           </a:p>
@@ -3764,7 +3764,7 @@
           <a:p>
             <a:fld id="{02109FA5-8937-4EFE-A1A6-BD6EB76E3D9A}" type="datetimeFigureOut">
               <a:rPr lang="he-IL" smtClean="0"/>
-              <a:t>י"א/אדר א/תשפ"ד</a:t>
+              <a:t>כ"ג/חשון/תשפ"ו</a:t>
             </a:fld>
             <a:endParaRPr lang="he-IL"/>
           </a:p>
@@ -3906,7 +3906,7 @@
           <a:p>
             <a:fld id="{02109FA5-8937-4EFE-A1A6-BD6EB76E3D9A}" type="datetimeFigureOut">
               <a:rPr lang="he-IL" smtClean="0"/>
-              <a:t>י"א/אדר א/תשפ"ד</a:t>
+              <a:t>כ"ג/חשון/תשפ"ו</a:t>
             </a:fld>
             <a:endParaRPr lang="he-IL"/>
           </a:p>
@@ -4019,7 +4019,7 @@
           <a:p>
             <a:fld id="{02109FA5-8937-4EFE-A1A6-BD6EB76E3D9A}" type="datetimeFigureOut">
               <a:rPr lang="he-IL" smtClean="0"/>
-              <a:t>י"א/אדר א/תשפ"ד</a:t>
+              <a:t>כ"ג/חשון/תשפ"ו</a:t>
             </a:fld>
             <a:endParaRPr lang="he-IL"/>
           </a:p>
@@ -4332,7 +4332,7 @@
           <a:p>
             <a:fld id="{02109FA5-8937-4EFE-A1A6-BD6EB76E3D9A}" type="datetimeFigureOut">
               <a:rPr lang="he-IL" smtClean="0"/>
-              <a:t>י"א/אדר א/תשפ"ד</a:t>
+              <a:t>כ"ג/חשון/תשפ"ו</a:t>
             </a:fld>
             <a:endParaRPr lang="he-IL"/>
           </a:p>
@@ -4625,7 +4625,7 @@
           <a:p>
             <a:fld id="{02109FA5-8937-4EFE-A1A6-BD6EB76E3D9A}" type="datetimeFigureOut">
               <a:rPr lang="he-IL" smtClean="0"/>
-              <a:t>י"א/אדר א/תשפ"ד</a:t>
+              <a:t>כ"ג/חשון/תשפ"ו</a:t>
             </a:fld>
             <a:endParaRPr lang="he-IL"/>
           </a:p>
@@ -4868,7 +4868,7 @@
           <a:p>
             <a:fld id="{02109FA5-8937-4EFE-A1A6-BD6EB76E3D9A}" type="datetimeFigureOut">
               <a:rPr lang="he-IL" smtClean="0"/>
-              <a:t>י"א/אדר א/תשפ"ד</a:t>
+              <a:t>כ"ג/חשון/תשפ"ו</a:t>
             </a:fld>
             <a:endParaRPr lang="he-IL"/>
           </a:p>
@@ -5446,7 +5446,7 @@
           <a:lstStyle/>
           <a:p>
             <a:r>
-              <a:rPr lang="en-US" dirty="0">
+              <a:rPr lang="en-US">
                 <a:solidFill>
                   <a:schemeClr val="bg1"/>
                 </a:solidFill>
@@ -5454,7 +5454,7 @@
                 <a:latin typeface="Miriam Libre" pitchFamily="2" charset="-79"/>
                 <a:cs typeface="Miriam Libre" pitchFamily="2" charset="-79"/>
               </a:rPr>
-              <a:t>February 2024</a:t>
+              <a:t>Winter 2025/26</a:t>
             </a:r>
             <a:endParaRPr lang="he-IL" dirty="0">
               <a:solidFill>

</xml_diff>